<commit_message>
Update some slides and readmes
</commit_message>
<xml_diff>
--- a/mern-app/React.pptx
+++ b/mern-app/React.pptx
@@ -6,7 +6,9 @@
   </p:sldMasterIdLst>
   <p:sldIdLst>
     <p:sldId id="256" r:id="rId2"/>
-    <p:sldId id="257" r:id="rId3"/>
+    <p:sldId id="258" r:id="rId3"/>
+    <p:sldId id="257" r:id="rId4"/>
+    <p:sldId id="259" r:id="rId5"/>
   </p:sldIdLst>
   <p:sldSz cx="12192000" cy="6858000"/>
   <p:notesSz cx="6858000" cy="9144000"/>
@@ -335,7 +337,7 @@
             <a:fld id="{A37D6D71-8B28-4ED6-B932-04B197003D23}" type="datetimeFigureOut">
               <a:rPr lang="en-US" smtClean="0"/>
               <a:pPr algn="r"/>
-              <a:t>7/19/2021</a:t>
+              <a:t>7/21/2021</a:t>
             </a:fld>
             <a:endParaRPr lang="en-US" dirty="0"/>
           </a:p>
@@ -557,7 +559,7 @@
             <a:fld id="{A37D6D71-8B28-4ED6-B932-04B197003D23}" type="datetimeFigureOut">
               <a:rPr lang="en-US" smtClean="0"/>
               <a:pPr algn="r"/>
-              <a:t>7/19/2021</a:t>
+              <a:t>7/21/2021</a:t>
             </a:fld>
             <a:endParaRPr lang="en-US" dirty="0"/>
           </a:p>
@@ -840,7 +842,7 @@
             <a:fld id="{A37D6D71-8B28-4ED6-B932-04B197003D23}" type="datetimeFigureOut">
               <a:rPr lang="en-US" smtClean="0"/>
               <a:pPr algn="r"/>
-              <a:t>7/19/2021</a:t>
+              <a:t>7/21/2021</a:t>
             </a:fld>
             <a:endParaRPr lang="en-US" dirty="0"/>
           </a:p>
@@ -1054,7 +1056,7 @@
             <a:fld id="{A37D6D71-8B28-4ED6-B932-04B197003D23}" type="datetimeFigureOut">
               <a:rPr lang="en-US" smtClean="0"/>
               <a:pPr algn="r"/>
-              <a:t>7/19/2021</a:t>
+              <a:t>7/21/2021</a:t>
             </a:fld>
             <a:endParaRPr lang="en-US" dirty="0"/>
           </a:p>
@@ -1392,7 +1394,7 @@
             <a:fld id="{A37D6D71-8B28-4ED6-B932-04B197003D23}" type="datetimeFigureOut">
               <a:rPr lang="en-US" smtClean="0"/>
               <a:pPr algn="r"/>
-              <a:t>7/19/2021</a:t>
+              <a:t>7/21/2021</a:t>
             </a:fld>
             <a:endParaRPr lang="en-US" dirty="0"/>
           </a:p>
@@ -1667,7 +1669,7 @@
             <a:fld id="{A37D6D71-8B28-4ED6-B932-04B197003D23}" type="datetimeFigureOut">
               <a:rPr lang="en-US" smtClean="0"/>
               <a:pPr algn="r"/>
-              <a:t>7/19/2021</a:t>
+              <a:t>7/21/2021</a:t>
             </a:fld>
             <a:endParaRPr lang="en-US" dirty="0"/>
           </a:p>
@@ -2056,7 +2058,7 @@
             <a:fld id="{A37D6D71-8B28-4ED6-B932-04B197003D23}" type="datetimeFigureOut">
               <a:rPr lang="en-US" smtClean="0"/>
               <a:pPr algn="r"/>
-              <a:t>7/19/2021</a:t>
+              <a:t>7/21/2021</a:t>
             </a:fld>
             <a:endParaRPr lang="en-US" dirty="0"/>
           </a:p>
@@ -2233,7 +2235,7 @@
             <a:fld id="{A37D6D71-8B28-4ED6-B932-04B197003D23}" type="datetimeFigureOut">
               <a:rPr lang="en-US" smtClean="0"/>
               <a:pPr algn="r"/>
-              <a:t>7/19/2021</a:t>
+              <a:t>7/21/2021</a:t>
             </a:fld>
             <a:endParaRPr lang="en-US" dirty="0"/>
           </a:p>
@@ -2354,7 +2356,7 @@
             <a:fld id="{A37D6D71-8B28-4ED6-B932-04B197003D23}" type="datetimeFigureOut">
               <a:rPr lang="en-US" smtClean="0"/>
               <a:pPr algn="r"/>
-              <a:t>7/19/2021</a:t>
+              <a:t>7/21/2021</a:t>
             </a:fld>
             <a:endParaRPr lang="en-US" dirty="0"/>
           </a:p>
@@ -2639,7 +2641,7 @@
             <a:fld id="{A37D6D71-8B28-4ED6-B932-04B197003D23}" type="datetimeFigureOut">
               <a:rPr lang="en-US" smtClean="0"/>
               <a:pPr algn="r"/>
-              <a:t>7/19/2021</a:t>
+              <a:t>7/21/2021</a:t>
             </a:fld>
             <a:endParaRPr lang="en-US" dirty="0"/>
           </a:p>
@@ -2940,7 +2942,7 @@
             <a:fld id="{A37D6D71-8B28-4ED6-B932-04B197003D23}" type="datetimeFigureOut">
               <a:rPr lang="en-US" smtClean="0"/>
               <a:pPr algn="r"/>
-              <a:t>7/19/2021</a:t>
+              <a:t>7/21/2021</a:t>
             </a:fld>
             <a:endParaRPr lang="en-US" dirty="0"/>
           </a:p>
@@ -3288,7 +3290,7 @@
             <a:fld id="{A37D6D71-8B28-4ED6-B932-04B197003D23}" type="datetimeFigureOut">
               <a:rPr lang="en-US" smtClean="0"/>
               <a:pPr algn="r"/>
-              <a:t>7/19/2021</a:t>
+              <a:t>7/21/2021</a:t>
             </a:fld>
             <a:endParaRPr lang="en-US" spc="50" dirty="0"/>
           </a:p>
@@ -3730,7 +3732,7 @@
       </p:grpSpPr>
       <p:sp useBgFill="1">
         <p:nvSpPr>
-          <p:cNvPr id="137" name="Rectangle 136">
+          <p:cNvPr id="192" name="Rectangle 191">
             <a:extLst>
               <a:ext uri="{FF2B5EF4-FFF2-40B4-BE49-F238E27FC236}">
                 <a16:creationId xmlns:a16="http://schemas.microsoft.com/office/drawing/2014/main" id="{4AA13AD3-0A4F-475A-BEBB-DEEFF5C096C3}"/>
@@ -3790,7 +3792,7 @@
       </p:sp>
       <p:sp>
         <p:nvSpPr>
-          <p:cNvPr id="139" name="Rectangle 138">
+          <p:cNvPr id="193" name="Rectangle 192">
             <a:extLst>
               <a:ext uri="{FF2B5EF4-FFF2-40B4-BE49-F238E27FC236}">
                 <a16:creationId xmlns:a16="http://schemas.microsoft.com/office/drawing/2014/main" id="{4AB109E1-45E3-4986-9663-C3EAAC041219}"/>
@@ -3853,7 +3855,7 @@
       </p:sp>
       <p:sp>
         <p:nvSpPr>
-          <p:cNvPr id="141" name="Rectangle 140">
+          <p:cNvPr id="194" name="Rectangle 193">
             <a:extLst>
               <a:ext uri="{FF2B5EF4-FFF2-40B4-BE49-F238E27FC236}">
                 <a16:creationId xmlns:a16="http://schemas.microsoft.com/office/drawing/2014/main" id="{EDEE9D42-BBE7-4427-9BC3-971CE96F1E29}"/>
@@ -3945,7 +3947,7 @@
             <a:pPr algn="l"/>
             <a:r>
               <a:rPr lang="en-US" dirty="0"/>
-              <a:t>HTML</a:t>
+              <a:t>React</a:t>
             </a:r>
           </a:p>
         </p:txBody>
@@ -3980,12 +3982,8 @@
           <a:p>
             <a:pPr algn="l"/>
             <a:r>
-              <a:rPr lang="en-US" dirty="0" err="1"/>
-              <a:t>HyperText</a:t>
-            </a:r>
-            <a:r>
               <a:rPr lang="en-US" dirty="0"/>
-              <a:t> Markup Language</a:t>
+              <a:t>A JavaScript library for building user interfaces</a:t>
             </a:r>
           </a:p>
           <a:p>
@@ -3996,10 +3994,10 @@
       </p:sp>
       <p:pic>
         <p:nvPicPr>
-          <p:cNvPr id="1028" name="Picture 4" descr="Html5 icon, • html icon - Free download on Iconfinder">
-            <a:extLst>
-              <a:ext uri="{FF2B5EF4-FFF2-40B4-BE49-F238E27FC236}">
-                <a16:creationId xmlns:a16="http://schemas.microsoft.com/office/drawing/2014/main" id="{453E99E8-31BE-4E04-A424-9E312EEDCEB6}"/>
+          <p:cNvPr id="1026" name="Picture 2" descr="React (JavaScript library) - Wikipedia">
+            <a:extLst>
+              <a:ext uri="{FF2B5EF4-FFF2-40B4-BE49-F238E27FC236}">
+                <a16:creationId xmlns:a16="http://schemas.microsoft.com/office/drawing/2014/main" id="{5188ADA0-E35F-4546-8DFC-25BA41E134B1}"/>
               </a:ext>
             </a:extLst>
           </p:cNvPr>
@@ -4016,7 +4014,7 @@
               </a:ext>
             </a:extLst>
           </a:blip>
-          <a:srcRect t="3334" b="11834"/>
+          <a:srcRect l="8327" r="8271" b="-2"/>
           <a:stretch/>
         </p:blipFill>
         <p:spPr bwMode="auto">
@@ -4184,7 +4182,7 @@
           <a:p>
             <a:r>
               <a:rPr lang="en-US" dirty="0"/>
-              <a:t>Creation of HTML</a:t>
+              <a:t>Goal</a:t>
             </a:r>
           </a:p>
         </p:txBody>
@@ -4216,7 +4214,7 @@
             </a:pPr>
             <a:r>
               <a:rPr lang="en-US" dirty="0"/>
-              <a:t>Created by Tim Berners-Lee in 1993</a:t>
+              <a:t>Keeping in mind we have a range of experience with React, starting with basic to more complex concepts to try and fill in some gaps in knowledge and give our team a firmer foundation in React for our frontend work</a:t>
             </a:r>
           </a:p>
           <a:p>
@@ -4226,15 +4224,796 @@
             </a:pPr>
             <a:r>
               <a:rPr lang="en-US" dirty="0"/>
-              <a:t>Describes the structure of a web page semantically and originally also handled the appearance of the document</a:t>
-            </a:r>
-          </a:p>
-        </p:txBody>
-      </p:sp>
+              <a:t>Showcasing some helpful React libraries</a:t>
+            </a:r>
+          </a:p>
+        </p:txBody>
+      </p:sp>
+    </p:spTree>
+    <p:extLst>
+      <p:ext uri="{BB962C8B-B14F-4D97-AF65-F5344CB8AC3E}">
+        <p14:creationId xmlns:p14="http://schemas.microsoft.com/office/powerpoint/2010/main" val="1238110612"/>
+      </p:ext>
+    </p:extLst>
+  </p:cSld>
+  <p:clrMapOvr>
+    <a:masterClrMapping/>
+  </p:clrMapOvr>
+</p:sld>
+</file>
+
+<file path=ppt/slides/slide3.xml><?xml version="1.0" encoding="utf-8"?>
+<p:sld xmlns:a="http://schemas.openxmlformats.org/drawingml/2006/main" xmlns:r="http://schemas.openxmlformats.org/officeDocument/2006/relationships" xmlns:p="http://schemas.openxmlformats.org/presentationml/2006/main">
+  <p:cSld>
+    <p:spTree>
+      <p:nvGrpSpPr>
+        <p:cNvPr id="1" name=""/>
+        <p:cNvGrpSpPr/>
+        <p:nvPr/>
+      </p:nvGrpSpPr>
+      <p:grpSpPr>
+        <a:xfrm>
+          <a:off x="0" y="0"/>
+          <a:ext cx="0" cy="0"/>
+          <a:chOff x="0" y="0"/>
+          <a:chExt cx="0" cy="0"/>
+        </a:xfrm>
+      </p:grpSpPr>
+      <p:sp>
+        <p:nvSpPr>
+          <p:cNvPr id="2" name="Title 1">
+            <a:extLst>
+              <a:ext uri="{FF2B5EF4-FFF2-40B4-BE49-F238E27FC236}">
+                <a16:creationId xmlns:a16="http://schemas.microsoft.com/office/drawing/2014/main" id="{1AAA912E-0B65-4468-973A-E8B66F85A70D}"/>
+              </a:ext>
+            </a:extLst>
+          </p:cNvPr>
+          <p:cNvSpPr>
+            <a:spLocks noGrp="1"/>
+          </p:cNvSpPr>
+          <p:nvPr>
+            <p:ph type="title"/>
+          </p:nvPr>
+        </p:nvSpPr>
+        <p:spPr/>
+        <p:txBody>
+          <a:bodyPr/>
+          <a:lstStyle/>
+          <a:p>
+            <a:r>
+              <a:rPr lang="en-US" dirty="0"/>
+              <a:t>Creation of React</a:t>
+            </a:r>
+          </a:p>
+        </p:txBody>
+      </p:sp>
+      <p:sp>
+        <p:nvSpPr>
+          <p:cNvPr id="3" name="Content Placeholder 2">
+            <a:extLst>
+              <a:ext uri="{FF2B5EF4-FFF2-40B4-BE49-F238E27FC236}">
+                <a16:creationId xmlns:a16="http://schemas.microsoft.com/office/drawing/2014/main" id="{B2857673-E02D-4132-9857-5DB12A5F3765}"/>
+              </a:ext>
+            </a:extLst>
+          </p:cNvPr>
+          <p:cNvSpPr>
+            <a:spLocks noGrp="1"/>
+          </p:cNvSpPr>
+          <p:nvPr>
+            <p:ph idx="1"/>
+          </p:nvPr>
+        </p:nvSpPr>
+        <p:spPr/>
+        <p:txBody>
+          <a:bodyPr/>
+          <a:lstStyle/>
+          <a:p>
+            <a:pPr marL="457200" indent="-457200">
+              <a:buFont typeface="Arial" panose="020B0604020202020204" pitchFamily="34" charset="0"/>
+              <a:buChar char="•"/>
+            </a:pPr>
+            <a:r>
+              <a:rPr lang="en-US" dirty="0"/>
+              <a:t>Created by Jordan Walke at Facebook in 2011</a:t>
+            </a:r>
+          </a:p>
+          <a:p>
+            <a:pPr marL="457200" indent="-457200">
+              <a:buFont typeface="Arial" panose="020B0604020202020204" pitchFamily="34" charset="0"/>
+              <a:buChar char="•"/>
+            </a:pPr>
+            <a:r>
+              <a:rPr lang="en-US" dirty="0"/>
+              <a:t>Open-sourced in May 2013</a:t>
+            </a:r>
+          </a:p>
+          <a:p>
+            <a:pPr marL="457200" indent="-457200">
+              <a:buFont typeface="Arial" panose="020B0604020202020204" pitchFamily="34" charset="0"/>
+              <a:buChar char="•"/>
+            </a:pPr>
+            <a:r>
+              <a:rPr lang="en-US" dirty="0"/>
+              <a:t>Contributed to by over a thousand developers</a:t>
+            </a:r>
+          </a:p>
+          <a:p>
+            <a:pPr marL="457200" indent="-457200">
+              <a:buFont typeface="Arial" panose="020B0604020202020204" pitchFamily="34" charset="0"/>
+              <a:buChar char="•"/>
+            </a:pPr>
+            <a:r>
+              <a:rPr lang="en-US" dirty="0"/>
+              <a:t>Now used by Netflix, New York Times, Airbnb, Discord etc.</a:t>
+            </a:r>
+          </a:p>
+        </p:txBody>
+      </p:sp>
+      <p:pic>
+        <p:nvPicPr>
+          <p:cNvPr id="2050" name="Picture 2" descr="Facebook logo and symbol, meaning, history, PNG">
+            <a:extLst>
+              <a:ext uri="{FF2B5EF4-FFF2-40B4-BE49-F238E27FC236}">
+                <a16:creationId xmlns:a16="http://schemas.microsoft.com/office/drawing/2014/main" id="{CAC472AE-CBFA-42DC-B9D3-372DA2F2B55D}"/>
+              </a:ext>
+            </a:extLst>
+          </p:cNvPr>
+          <p:cNvPicPr>
+            <a:picLocks noChangeAspect="1" noChangeArrowheads="1"/>
+          </p:cNvPicPr>
+          <p:nvPr/>
+        </p:nvPicPr>
+        <p:blipFill rotWithShape="1">
+          <a:blip r:embed="rId2">
+            <a:extLst>
+              <a:ext uri="{28A0092B-C50C-407E-A947-70E740481C1C}">
+                <a14:useLocalDpi xmlns:a14="http://schemas.microsoft.com/office/drawing/2010/main" val="0"/>
+              </a:ext>
+            </a:extLst>
+          </a:blip>
+          <a:srcRect l="20295" t="4634" r="20862" b="3129"/>
+          <a:stretch/>
+        </p:blipFill>
+        <p:spPr bwMode="auto">
+          <a:xfrm>
+            <a:off x="9666514" y="273040"/>
+            <a:ext cx="1642188" cy="1608819"/>
+          </a:xfrm>
+          <a:prstGeom prst="rect">
+            <a:avLst/>
+          </a:prstGeom>
+          <a:noFill/>
+          <a:extLst>
+            <a:ext uri="{909E8E84-426E-40DD-AFC4-6F175D3DCCD1}">
+              <a14:hiddenFill xmlns:a14="http://schemas.microsoft.com/office/drawing/2010/main">
+                <a:solidFill>
+                  <a:srgbClr val="FFFFFF"/>
+                </a:solidFill>
+              </a14:hiddenFill>
+            </a:ext>
+          </a:extLst>
+        </p:spPr>
+      </p:pic>
+      <p:pic>
+        <p:nvPicPr>
+          <p:cNvPr id="6" name="Picture 5">
+            <a:extLst>
+              <a:ext uri="{FF2B5EF4-FFF2-40B4-BE49-F238E27FC236}">
+                <a16:creationId xmlns:a16="http://schemas.microsoft.com/office/drawing/2014/main" id="{565B0558-4422-4897-9C82-888C984FDEF6}"/>
+              </a:ext>
+            </a:extLst>
+          </p:cNvPr>
+          <p:cNvPicPr>
+            <a:picLocks noChangeAspect="1"/>
+          </p:cNvPicPr>
+          <p:nvPr/>
+        </p:nvPicPr>
+        <p:blipFill>
+          <a:blip r:embed="rId3"/>
+          <a:stretch>
+            <a:fillRect/>
+          </a:stretch>
+        </p:blipFill>
+        <p:spPr>
+          <a:xfrm>
+            <a:off x="4933603" y="5161953"/>
+            <a:ext cx="1616343" cy="1224964"/>
+          </a:xfrm>
+          <a:prstGeom prst="rect">
+            <a:avLst/>
+          </a:prstGeom>
+        </p:spPr>
+      </p:pic>
+      <p:pic>
+        <p:nvPicPr>
+          <p:cNvPr id="2052" name="Picture 4" descr="Discord&amp;#39;s Branding Guidelines">
+            <a:extLst>
+              <a:ext uri="{FF2B5EF4-FFF2-40B4-BE49-F238E27FC236}">
+                <a16:creationId xmlns:a16="http://schemas.microsoft.com/office/drawing/2014/main" id="{0D120FB1-96EA-4BAD-A9A7-D3C83FCB707B}"/>
+              </a:ext>
+            </a:extLst>
+          </p:cNvPr>
+          <p:cNvPicPr>
+            <a:picLocks noChangeAspect="1" noChangeArrowheads="1"/>
+          </p:cNvPicPr>
+          <p:nvPr/>
+        </p:nvPicPr>
+        <p:blipFill>
+          <a:blip r:embed="rId4">
+            <a:extLst>
+              <a:ext uri="{28A0092B-C50C-407E-A947-70E740481C1C}">
+                <a14:useLocalDpi xmlns:a14="http://schemas.microsoft.com/office/drawing/2010/main" val="0"/>
+              </a:ext>
+            </a:extLst>
+          </a:blip>
+          <a:srcRect/>
+          <a:stretch>
+            <a:fillRect/>
+          </a:stretch>
+        </p:blipFill>
+        <p:spPr bwMode="auto">
+          <a:xfrm>
+            <a:off x="7533387" y="5352320"/>
+            <a:ext cx="3095466" cy="848073"/>
+          </a:xfrm>
+          <a:prstGeom prst="rect">
+            <a:avLst/>
+          </a:prstGeom>
+          <a:noFill/>
+          <a:extLst>
+            <a:ext uri="{909E8E84-426E-40DD-AFC4-6F175D3DCCD1}">
+              <a14:hiddenFill xmlns:a14="http://schemas.microsoft.com/office/drawing/2010/main">
+                <a:solidFill>
+                  <a:srgbClr val="FFFFFF"/>
+                </a:solidFill>
+              </a14:hiddenFill>
+            </a:ext>
+          </a:extLst>
+        </p:spPr>
+      </p:pic>
+      <p:pic>
+        <p:nvPicPr>
+          <p:cNvPr id="2054" name="Picture 6" descr="Download Netflix Logo in SVG Vector or PNG File Format - Logo.wine">
+            <a:extLst>
+              <a:ext uri="{FF2B5EF4-FFF2-40B4-BE49-F238E27FC236}">
+                <a16:creationId xmlns:a16="http://schemas.microsoft.com/office/drawing/2014/main" id="{74113AD5-8C75-4C2B-A1D6-C888522B6494}"/>
+              </a:ext>
+            </a:extLst>
+          </p:cNvPr>
+          <p:cNvPicPr>
+            <a:picLocks noChangeAspect="1" noChangeArrowheads="1"/>
+          </p:cNvPicPr>
+          <p:nvPr/>
+        </p:nvPicPr>
+        <p:blipFill rotWithShape="1">
+          <a:blip r:embed="rId5">
+            <a:extLst>
+              <a:ext uri="{28A0092B-C50C-407E-A947-70E740481C1C}">
+                <a14:useLocalDpi xmlns:a14="http://schemas.microsoft.com/office/drawing/2010/main" val="0"/>
+              </a:ext>
+            </a:extLst>
+          </a:blip>
+          <a:srcRect t="26836" b="29310"/>
+          <a:stretch/>
+        </p:blipFill>
+        <p:spPr bwMode="auto">
+          <a:xfrm>
+            <a:off x="1238603" y="5348478"/>
+            <a:ext cx="2913948" cy="851915"/>
+          </a:xfrm>
+          <a:prstGeom prst="rect">
+            <a:avLst/>
+          </a:prstGeom>
+          <a:noFill/>
+          <a:extLst>
+            <a:ext uri="{909E8E84-426E-40DD-AFC4-6F175D3DCCD1}">
+              <a14:hiddenFill xmlns:a14="http://schemas.microsoft.com/office/drawing/2010/main">
+                <a:solidFill>
+                  <a:srgbClr val="FFFFFF"/>
+                </a:solidFill>
+              </a14:hiddenFill>
+            </a:ext>
+          </a:extLst>
+        </p:spPr>
+      </p:pic>
     </p:spTree>
     <p:extLst>
       <p:ext uri="{BB962C8B-B14F-4D97-AF65-F5344CB8AC3E}">
         <p14:creationId xmlns:p14="http://schemas.microsoft.com/office/powerpoint/2010/main" val="2438667103"/>
+      </p:ext>
+    </p:extLst>
+  </p:cSld>
+  <p:clrMapOvr>
+    <a:masterClrMapping/>
+  </p:clrMapOvr>
+</p:sld>
+</file>
+
+<file path=ppt/slides/slide4.xml><?xml version="1.0" encoding="utf-8"?>
+<p:sld xmlns:a="http://schemas.openxmlformats.org/drawingml/2006/main" xmlns:r="http://schemas.openxmlformats.org/officeDocument/2006/relationships" xmlns:p="http://schemas.openxmlformats.org/presentationml/2006/main">
+  <p:cSld>
+    <p:spTree>
+      <p:nvGrpSpPr>
+        <p:cNvPr id="1" name=""/>
+        <p:cNvGrpSpPr/>
+        <p:nvPr/>
+      </p:nvGrpSpPr>
+      <p:grpSpPr>
+        <a:xfrm>
+          <a:off x="0" y="0"/>
+          <a:ext cx="0" cy="0"/>
+          <a:chOff x="0" y="0"/>
+          <a:chExt cx="0" cy="0"/>
+        </a:xfrm>
+      </p:grpSpPr>
+      <p:sp>
+        <p:nvSpPr>
+          <p:cNvPr id="2" name="Title 1">
+            <a:extLst>
+              <a:ext uri="{FF2B5EF4-FFF2-40B4-BE49-F238E27FC236}">
+                <a16:creationId xmlns:a16="http://schemas.microsoft.com/office/drawing/2014/main" id="{1AAA912E-0B65-4468-973A-E8B66F85A70D}"/>
+              </a:ext>
+            </a:extLst>
+          </p:cNvPr>
+          <p:cNvSpPr>
+            <a:spLocks noGrp="1"/>
+          </p:cNvSpPr>
+          <p:nvPr>
+            <p:ph type="title"/>
+          </p:nvPr>
+        </p:nvSpPr>
+        <p:spPr/>
+        <p:txBody>
+          <a:bodyPr/>
+          <a:lstStyle/>
+          <a:p>
+            <a:r>
+              <a:rPr lang="en-US" dirty="0"/>
+              <a:t>Topics</a:t>
+            </a:r>
+          </a:p>
+        </p:txBody>
+      </p:sp>
+      <p:sp>
+        <p:nvSpPr>
+          <p:cNvPr id="3" name="Content Placeholder 2">
+            <a:extLst>
+              <a:ext uri="{FF2B5EF4-FFF2-40B4-BE49-F238E27FC236}">
+                <a16:creationId xmlns:a16="http://schemas.microsoft.com/office/drawing/2014/main" id="{B2857673-E02D-4132-9857-5DB12A5F3765}"/>
+              </a:ext>
+            </a:extLst>
+          </p:cNvPr>
+          <p:cNvSpPr>
+            <a:spLocks noGrp="1"/>
+          </p:cNvSpPr>
+          <p:nvPr>
+            <p:ph idx="1"/>
+          </p:nvPr>
+        </p:nvSpPr>
+        <p:spPr>
+          <a:xfrm>
+            <a:off x="960120" y="2416030"/>
+            <a:ext cx="10268712" cy="3942826"/>
+          </a:xfrm>
+        </p:spPr>
+        <p:txBody>
+          <a:bodyPr numCol="2">
+            <a:normAutofit/>
+          </a:bodyPr>
+          <a:lstStyle/>
+          <a:p>
+            <a:pPr marL="514350" indent="-514350">
+              <a:lnSpc>
+                <a:spcPct val="100000"/>
+              </a:lnSpc>
+              <a:spcBef>
+                <a:spcPts val="200"/>
+              </a:spcBef>
+              <a:spcAft>
+                <a:spcPts val="200"/>
+              </a:spcAft>
+              <a:buFont typeface="+mj-lt"/>
+              <a:buAutoNum type="arabicPeriod"/>
+            </a:pPr>
+            <a:r>
+              <a:rPr lang="en-US" sz="1900" dirty="0"/>
+              <a:t>Create React App</a:t>
+            </a:r>
+          </a:p>
+          <a:p>
+            <a:pPr marL="788670" lvl="1" indent="-514350">
+              <a:lnSpc>
+                <a:spcPct val="100000"/>
+              </a:lnSpc>
+              <a:spcBef>
+                <a:spcPts val="200"/>
+              </a:spcBef>
+              <a:spcAft>
+                <a:spcPts val="200"/>
+              </a:spcAft>
+              <a:buFont typeface="+mj-lt"/>
+              <a:buAutoNum type="arabicPeriod"/>
+            </a:pPr>
+            <a:r>
+              <a:rPr lang="en-US" sz="1600" dirty="0"/>
+              <a:t>Folders and files</a:t>
+            </a:r>
+          </a:p>
+          <a:p>
+            <a:pPr marL="788670" lvl="1" indent="-514350">
+              <a:lnSpc>
+                <a:spcPct val="100000"/>
+              </a:lnSpc>
+              <a:spcBef>
+                <a:spcPts val="200"/>
+              </a:spcBef>
+              <a:spcAft>
+                <a:spcPts val="200"/>
+              </a:spcAft>
+              <a:buFont typeface="+mj-lt"/>
+              <a:buAutoNum type="arabicPeriod"/>
+            </a:pPr>
+            <a:r>
+              <a:rPr lang="en-US" sz="1600" dirty="0"/>
+              <a:t>Configuration</a:t>
+            </a:r>
+          </a:p>
+          <a:p>
+            <a:pPr lvl="1" indent="0">
+              <a:lnSpc>
+                <a:spcPct val="100000"/>
+              </a:lnSpc>
+              <a:spcBef>
+                <a:spcPts val="200"/>
+              </a:spcBef>
+              <a:spcAft>
+                <a:spcPts val="200"/>
+              </a:spcAft>
+              <a:buNone/>
+            </a:pPr>
+            <a:endParaRPr lang="en-US" sz="1600" dirty="0"/>
+          </a:p>
+          <a:p>
+            <a:pPr marL="514350" indent="-514350">
+              <a:lnSpc>
+                <a:spcPct val="100000"/>
+              </a:lnSpc>
+              <a:spcBef>
+                <a:spcPts val="200"/>
+              </a:spcBef>
+              <a:spcAft>
+                <a:spcPts val="200"/>
+              </a:spcAft>
+              <a:buFont typeface="+mj-lt"/>
+              <a:buAutoNum type="arabicPeriod"/>
+            </a:pPr>
+            <a:r>
+              <a:rPr lang="en-US" sz="1900" dirty="0"/>
+              <a:t>Components</a:t>
+            </a:r>
+          </a:p>
+          <a:p>
+            <a:pPr marL="788670" lvl="1" indent="-514350">
+              <a:lnSpc>
+                <a:spcPct val="100000"/>
+              </a:lnSpc>
+              <a:spcBef>
+                <a:spcPts val="200"/>
+              </a:spcBef>
+              <a:spcAft>
+                <a:spcPts val="200"/>
+              </a:spcAft>
+              <a:buFont typeface="+mj-lt"/>
+              <a:buAutoNum type="arabicPeriod"/>
+            </a:pPr>
+            <a:r>
+              <a:rPr lang="en-US" sz="1600" dirty="0" err="1"/>
+              <a:t>onClick</a:t>
+            </a:r>
+            <a:endParaRPr lang="en-US" sz="1600" dirty="0"/>
+          </a:p>
+          <a:p>
+            <a:pPr marL="788670" lvl="1" indent="-514350">
+              <a:lnSpc>
+                <a:spcPct val="100000"/>
+              </a:lnSpc>
+              <a:spcBef>
+                <a:spcPts val="200"/>
+              </a:spcBef>
+              <a:spcAft>
+                <a:spcPts val="200"/>
+              </a:spcAft>
+              <a:buFont typeface="+mj-lt"/>
+              <a:buAutoNum type="arabicPeriod"/>
+            </a:pPr>
+            <a:r>
+              <a:rPr lang="en-US" sz="1600" dirty="0" err="1"/>
+              <a:t>useState</a:t>
+            </a:r>
+            <a:endParaRPr lang="en-US" sz="1600" dirty="0"/>
+          </a:p>
+          <a:p>
+            <a:pPr lvl="1" indent="0">
+              <a:lnSpc>
+                <a:spcPct val="100000"/>
+              </a:lnSpc>
+              <a:spcBef>
+                <a:spcPts val="200"/>
+              </a:spcBef>
+              <a:spcAft>
+                <a:spcPts val="200"/>
+              </a:spcAft>
+              <a:buNone/>
+            </a:pPr>
+            <a:endParaRPr lang="en-US" sz="1600" dirty="0"/>
+          </a:p>
+          <a:p>
+            <a:pPr marL="514350" indent="-514350">
+              <a:lnSpc>
+                <a:spcPct val="100000"/>
+              </a:lnSpc>
+              <a:spcBef>
+                <a:spcPts val="200"/>
+              </a:spcBef>
+              <a:spcAft>
+                <a:spcPts val="200"/>
+              </a:spcAft>
+              <a:buFont typeface="+mj-lt"/>
+              <a:buAutoNum type="arabicPeriod"/>
+            </a:pPr>
+            <a:r>
+              <a:rPr lang="en-US" sz="1900" dirty="0"/>
+              <a:t>Conditional Rendering</a:t>
+            </a:r>
+          </a:p>
+          <a:p>
+            <a:pPr marL="788670" lvl="1" indent="-514350">
+              <a:lnSpc>
+                <a:spcPct val="100000"/>
+              </a:lnSpc>
+              <a:spcBef>
+                <a:spcPts val="200"/>
+              </a:spcBef>
+              <a:spcAft>
+                <a:spcPts val="200"/>
+              </a:spcAft>
+              <a:buFont typeface="+mj-lt"/>
+              <a:buAutoNum type="arabicPeriod"/>
+            </a:pPr>
+            <a:r>
+              <a:rPr lang="en-US" sz="1600" dirty="0"/>
+              <a:t>Handling Input</a:t>
+            </a:r>
+          </a:p>
+          <a:p>
+            <a:pPr marL="788670" lvl="1" indent="-514350">
+              <a:lnSpc>
+                <a:spcPct val="100000"/>
+              </a:lnSpc>
+              <a:spcBef>
+                <a:spcPts val="200"/>
+              </a:spcBef>
+              <a:spcAft>
+                <a:spcPts val="200"/>
+              </a:spcAft>
+              <a:buFont typeface="+mj-lt"/>
+              <a:buAutoNum type="arabicPeriod"/>
+            </a:pPr>
+            <a:r>
+              <a:rPr lang="en-US" sz="1600" dirty="0"/>
+              <a:t>Forms and Input</a:t>
+            </a:r>
+          </a:p>
+          <a:p>
+            <a:pPr lvl="1" indent="0">
+              <a:lnSpc>
+                <a:spcPct val="100000"/>
+              </a:lnSpc>
+              <a:spcBef>
+                <a:spcPts val="200"/>
+              </a:spcBef>
+              <a:spcAft>
+                <a:spcPts val="200"/>
+              </a:spcAft>
+              <a:buNone/>
+            </a:pPr>
+            <a:endParaRPr lang="en-US" sz="1600" dirty="0"/>
+          </a:p>
+          <a:p>
+            <a:pPr marL="514350" indent="-514350">
+              <a:lnSpc>
+                <a:spcPct val="100000"/>
+              </a:lnSpc>
+              <a:spcBef>
+                <a:spcPts val="200"/>
+              </a:spcBef>
+              <a:spcAft>
+                <a:spcPts val="200"/>
+              </a:spcAft>
+              <a:buFont typeface="+mj-lt"/>
+              <a:buAutoNum type="arabicPeriod"/>
+            </a:pPr>
+            <a:r>
+              <a:rPr lang="en-US" sz="1900" dirty="0"/>
+              <a:t>Data Fetching</a:t>
+            </a:r>
+          </a:p>
+          <a:p>
+            <a:pPr marL="788670" lvl="1" indent="-514350">
+              <a:lnSpc>
+                <a:spcPct val="100000"/>
+              </a:lnSpc>
+              <a:spcBef>
+                <a:spcPts val="200"/>
+              </a:spcBef>
+              <a:spcAft>
+                <a:spcPts val="200"/>
+              </a:spcAft>
+              <a:buFont typeface="+mj-lt"/>
+              <a:buAutoNum type="arabicPeriod"/>
+            </a:pPr>
+            <a:r>
+              <a:rPr lang="en-US" sz="1600" dirty="0"/>
+              <a:t>Consuming an API</a:t>
+            </a:r>
+          </a:p>
+          <a:p>
+            <a:pPr marL="788670" lvl="1" indent="-514350">
+              <a:lnSpc>
+                <a:spcPct val="100000"/>
+              </a:lnSpc>
+              <a:spcBef>
+                <a:spcPts val="200"/>
+              </a:spcBef>
+              <a:spcAft>
+                <a:spcPts val="200"/>
+              </a:spcAft>
+              <a:buFont typeface="+mj-lt"/>
+              <a:buAutoNum type="arabicPeriod"/>
+            </a:pPr>
+            <a:r>
+              <a:rPr lang="en-US" sz="1600" dirty="0"/>
+              <a:t>Displaying Fetched Data</a:t>
+            </a:r>
+          </a:p>
+          <a:p>
+            <a:pPr marL="788670" lvl="1" indent="-514350">
+              <a:lnSpc>
+                <a:spcPct val="100000"/>
+              </a:lnSpc>
+              <a:spcBef>
+                <a:spcPts val="200"/>
+              </a:spcBef>
+              <a:spcAft>
+                <a:spcPts val="200"/>
+              </a:spcAft>
+              <a:buFont typeface="+mj-lt"/>
+              <a:buAutoNum type="arabicPeriod"/>
+            </a:pPr>
+            <a:r>
+              <a:rPr lang="en-US" sz="1600" dirty="0"/>
+              <a:t>React Query</a:t>
+            </a:r>
+          </a:p>
+          <a:p>
+            <a:pPr lvl="1" indent="0">
+              <a:lnSpc>
+                <a:spcPct val="100000"/>
+              </a:lnSpc>
+              <a:spcBef>
+                <a:spcPts val="200"/>
+              </a:spcBef>
+              <a:spcAft>
+                <a:spcPts val="200"/>
+              </a:spcAft>
+              <a:buNone/>
+            </a:pPr>
+            <a:endParaRPr lang="en-US" sz="1600" dirty="0"/>
+          </a:p>
+          <a:p>
+            <a:pPr marL="514350" indent="-514350">
+              <a:lnSpc>
+                <a:spcPct val="100000"/>
+              </a:lnSpc>
+              <a:buFont typeface="+mj-lt"/>
+              <a:buAutoNum type="arabicPeriod"/>
+            </a:pPr>
+            <a:r>
+              <a:rPr lang="en-US" sz="1900" dirty="0"/>
+              <a:t>React Router</a:t>
+            </a:r>
+          </a:p>
+          <a:p>
+            <a:pPr marL="788670" lvl="1" indent="-514350">
+              <a:lnSpc>
+                <a:spcPct val="100000"/>
+              </a:lnSpc>
+              <a:spcBef>
+                <a:spcPts val="200"/>
+              </a:spcBef>
+              <a:spcAft>
+                <a:spcPts val="200"/>
+              </a:spcAft>
+              <a:buFont typeface="+mj-lt"/>
+              <a:buAutoNum type="arabicPeriod"/>
+            </a:pPr>
+            <a:r>
+              <a:rPr lang="en-US" sz="1600" dirty="0"/>
+              <a:t>Creating multiple pages</a:t>
+            </a:r>
+          </a:p>
+          <a:p>
+            <a:pPr marL="788670" lvl="1" indent="-514350">
+              <a:lnSpc>
+                <a:spcPct val="100000"/>
+              </a:lnSpc>
+              <a:spcBef>
+                <a:spcPts val="200"/>
+              </a:spcBef>
+              <a:spcAft>
+                <a:spcPts val="200"/>
+              </a:spcAft>
+              <a:buFont typeface="+mj-lt"/>
+              <a:buAutoNum type="arabicPeriod"/>
+            </a:pPr>
+            <a:r>
+              <a:rPr lang="en-US" sz="1600" dirty="0"/>
+              <a:t>Dynamic Routing</a:t>
+            </a:r>
+          </a:p>
+          <a:p>
+            <a:pPr lvl="1" indent="0">
+              <a:lnSpc>
+                <a:spcPct val="100000"/>
+              </a:lnSpc>
+              <a:spcBef>
+                <a:spcPts val="200"/>
+              </a:spcBef>
+              <a:spcAft>
+                <a:spcPts val="200"/>
+              </a:spcAft>
+              <a:buNone/>
+            </a:pPr>
+            <a:endParaRPr lang="en-US" sz="1600" dirty="0"/>
+          </a:p>
+          <a:p>
+            <a:pPr marL="514350" indent="-514350">
+              <a:lnSpc>
+                <a:spcPct val="100000"/>
+              </a:lnSpc>
+              <a:buFont typeface="+mj-lt"/>
+              <a:buAutoNum type="arabicPeriod"/>
+            </a:pPr>
+            <a:r>
+              <a:rPr lang="en-US" sz="1900" dirty="0"/>
+              <a:t>React Context</a:t>
+            </a:r>
+          </a:p>
+          <a:p>
+            <a:pPr marL="788670" lvl="1" indent="-514350">
+              <a:lnSpc>
+                <a:spcPct val="100000"/>
+              </a:lnSpc>
+              <a:spcBef>
+                <a:spcPts val="200"/>
+              </a:spcBef>
+              <a:spcAft>
+                <a:spcPts val="200"/>
+              </a:spcAft>
+              <a:buFont typeface="+mj-lt"/>
+              <a:buAutoNum type="arabicPeriod"/>
+            </a:pPr>
+            <a:r>
+              <a:rPr lang="en-US" sz="1600" dirty="0"/>
+              <a:t>Storing local state</a:t>
+            </a:r>
+          </a:p>
+        </p:txBody>
+      </p:sp>
+    </p:spTree>
+    <p:extLst>
+      <p:ext uri="{BB962C8B-B14F-4D97-AF65-F5344CB8AC3E}">
+        <p14:creationId xmlns:p14="http://schemas.microsoft.com/office/powerpoint/2010/main" val="3444997062"/>
       </p:ext>
     </p:extLst>
   </p:cSld>

</xml_diff>